<commit_message>
Release slides for Gabe
</commit_message>
<xml_diff>
--- a/Documents/Hexscape/Release 1/Release Review Slides - Gabe.pptx
+++ b/Documents/Hexscape/Release 1/Release Review Slides - Gabe.pptx
@@ -8,9 +8,15 @@
     <p:sldId id="257" r:id="rId2"/>
     <p:sldId id="258" r:id="rId3"/>
     <p:sldId id="259" r:id="rId4"/>
-    <p:sldId id="260" r:id="rId5"/>
-    <p:sldId id="261" r:id="rId6"/>
-    <p:sldId id="262" r:id="rId7"/>
+    <p:sldId id="263" r:id="rId5"/>
+    <p:sldId id="260" r:id="rId6"/>
+    <p:sldId id="261" r:id="rId7"/>
+    <p:sldId id="264" r:id="rId8"/>
+    <p:sldId id="265" r:id="rId9"/>
+    <p:sldId id="266" r:id="rId10"/>
+    <p:sldId id="268" r:id="rId11"/>
+    <p:sldId id="267" r:id="rId12"/>
+    <p:sldId id="262" r:id="rId13"/>
   </p:sldIdLst>
   <p:sldSz cx="12192000" cy="6858000"/>
   <p:notesSz cx="6858000" cy="9144000"/>
@@ -110,10 +116,6 @@
     </a:lvl9pPr>
   </p:defaultTextStyle>
 </p:presentation>
-</file>
-
-<file path=ppt/revisionInfo.xml><?xml version="1.0" encoding="utf-8"?>
-<p1510:revInfo xmlns:a="http://schemas.openxmlformats.org/drawingml/2006/main" xmlns:r="http://schemas.openxmlformats.org/officeDocument/2006/relationships" xmlns:p1510="http://schemas.microsoft.com/office/powerpoint/2015/10/main"/>
 </file>
 
 <file path=ppt/slideLayouts/slideLayout1.xml><?xml version="1.0" encoding="utf-8"?>
@@ -6656,6 +6658,276 @@
 </p:sld>
 </file>
 
+<file path=ppt/slides/slide10.xml><?xml version="1.0" encoding="utf-8"?>
+<p:sld xmlns:a="http://schemas.openxmlformats.org/drawingml/2006/main" xmlns:r="http://schemas.openxmlformats.org/officeDocument/2006/relationships" xmlns:p="http://schemas.openxmlformats.org/presentationml/2006/main">
+  <p:cSld>
+    <p:spTree>
+      <p:nvGrpSpPr>
+        <p:cNvPr id="1" name=""/>
+        <p:cNvGrpSpPr/>
+        <p:nvPr/>
+      </p:nvGrpSpPr>
+      <p:grpSpPr>
+        <a:xfrm>
+          <a:off x="0" y="0"/>
+          <a:ext cx="0" cy="0"/>
+          <a:chOff x="0" y="0"/>
+          <a:chExt cx="0" cy="0"/>
+        </a:xfrm>
+      </p:grpSpPr>
+      <p:sp>
+        <p:nvSpPr>
+          <p:cNvPr id="2" name="Title 1">
+            <a:extLst>
+              <a:ext uri="{FF2B5EF4-FFF2-40B4-BE49-F238E27FC236}">
+                <a16:creationId xmlns:a16="http://schemas.microsoft.com/office/drawing/2014/main" id="{7A9BED1E-4464-447F-86F9-729DC386E282}"/>
+              </a:ext>
+            </a:extLst>
+          </p:cNvPr>
+          <p:cNvSpPr>
+            <a:spLocks noGrp="1"/>
+          </p:cNvSpPr>
+          <p:nvPr>
+            <p:ph type="title"/>
+          </p:nvPr>
+        </p:nvSpPr>
+        <p:spPr/>
+        <p:txBody>
+          <a:bodyPr/>
+          <a:lstStyle/>
+          <a:p>
+            <a:r>
+              <a:rPr lang="en-US" dirty="0"/>
+              <a:t>Sprint 5</a:t>
+            </a:r>
+          </a:p>
+        </p:txBody>
+      </p:sp>
+      <p:pic>
+        <p:nvPicPr>
+          <p:cNvPr id="4" name="Picture 3">
+            <a:extLst>
+              <a:ext uri="{FF2B5EF4-FFF2-40B4-BE49-F238E27FC236}">
+                <a16:creationId xmlns:a16="http://schemas.microsoft.com/office/drawing/2014/main" id="{BA6CB853-6BD4-49E5-B940-5BA268FA7D96}"/>
+              </a:ext>
+            </a:extLst>
+          </p:cNvPr>
+          <p:cNvPicPr>
+            <a:picLocks noChangeAspect="1"/>
+          </p:cNvPicPr>
+          <p:nvPr/>
+        </p:nvPicPr>
+        <p:blipFill>
+          <a:blip r:embed="rId2"/>
+          <a:stretch>
+            <a:fillRect/>
+          </a:stretch>
+        </p:blipFill>
+        <p:spPr>
+          <a:xfrm>
+            <a:off x="3249311" y="1221562"/>
+            <a:ext cx="5693377" cy="4414875"/>
+          </a:xfrm>
+          <a:prstGeom prst="rect">
+            <a:avLst/>
+          </a:prstGeom>
+        </p:spPr>
+      </p:pic>
+    </p:spTree>
+    <p:extLst>
+      <p:ext uri="{BB962C8B-B14F-4D97-AF65-F5344CB8AC3E}">
+        <p14:creationId xmlns:p14="http://schemas.microsoft.com/office/powerpoint/2010/main" val="4252774691"/>
+      </p:ext>
+    </p:extLst>
+  </p:cSld>
+  <p:clrMapOvr>
+    <a:masterClrMapping/>
+  </p:clrMapOvr>
+</p:sld>
+</file>
+
+<file path=ppt/slides/slide11.xml><?xml version="1.0" encoding="utf-8"?>
+<p:sld xmlns:a="http://schemas.openxmlformats.org/drawingml/2006/main" xmlns:r="http://schemas.openxmlformats.org/officeDocument/2006/relationships" xmlns:p="http://schemas.openxmlformats.org/presentationml/2006/main">
+  <p:cSld>
+    <p:spTree>
+      <p:nvGrpSpPr>
+        <p:cNvPr id="1" name=""/>
+        <p:cNvGrpSpPr/>
+        <p:nvPr/>
+      </p:nvGrpSpPr>
+      <p:grpSpPr>
+        <a:xfrm>
+          <a:off x="0" y="0"/>
+          <a:ext cx="0" cy="0"/>
+          <a:chOff x="0" y="0"/>
+          <a:chExt cx="0" cy="0"/>
+        </a:xfrm>
+      </p:grpSpPr>
+      <p:sp>
+        <p:nvSpPr>
+          <p:cNvPr id="2" name="Title 1">
+            <a:extLst>
+              <a:ext uri="{FF2B5EF4-FFF2-40B4-BE49-F238E27FC236}">
+                <a16:creationId xmlns:a16="http://schemas.microsoft.com/office/drawing/2014/main" id="{E6A88E44-BA06-4FE8-95CD-22C850789D2F}"/>
+              </a:ext>
+            </a:extLst>
+          </p:cNvPr>
+          <p:cNvSpPr>
+            <a:spLocks noGrp="1"/>
+          </p:cNvSpPr>
+          <p:nvPr>
+            <p:ph type="title"/>
+          </p:nvPr>
+        </p:nvSpPr>
+        <p:spPr/>
+        <p:txBody>
+          <a:bodyPr/>
+          <a:lstStyle/>
+          <a:p>
+            <a:r>
+              <a:rPr lang="en-US" dirty="0"/>
+              <a:t>Sprint 5</a:t>
+            </a:r>
+          </a:p>
+        </p:txBody>
+      </p:sp>
+      <p:sp>
+        <p:nvSpPr>
+          <p:cNvPr id="3" name="Text Placeholder 2">
+            <a:extLst>
+              <a:ext uri="{FF2B5EF4-FFF2-40B4-BE49-F238E27FC236}">
+                <a16:creationId xmlns:a16="http://schemas.microsoft.com/office/drawing/2014/main" id="{632C599F-0C37-41D9-87B9-D488BEE047B8}"/>
+              </a:ext>
+            </a:extLst>
+          </p:cNvPr>
+          <p:cNvSpPr>
+            <a:spLocks noGrp="1"/>
+          </p:cNvSpPr>
+          <p:nvPr>
+            <p:ph type="body" idx="1"/>
+          </p:nvPr>
+        </p:nvSpPr>
+        <p:spPr/>
+        <p:txBody>
+          <a:bodyPr/>
+          <a:lstStyle/>
+          <a:p>
+            <a:r>
+              <a:rPr lang="en-US" dirty="0"/>
+              <a:t>Billy’s Accomplishments</a:t>
+            </a:r>
+          </a:p>
+          <a:p>
+            <a:pPr lvl="1"/>
+            <a:r>
+              <a:rPr lang="en-US" dirty="0"/>
+              <a:t>Rendered animation videos. </a:t>
+            </a:r>
+          </a:p>
+          <a:p>
+            <a:pPr lvl="1"/>
+            <a:r>
+              <a:rPr lang="en-US" dirty="0"/>
+              <a:t>Created the town model.</a:t>
+            </a:r>
+          </a:p>
+        </p:txBody>
+      </p:sp>
+    </p:spTree>
+    <p:extLst>
+      <p:ext uri="{BB962C8B-B14F-4D97-AF65-F5344CB8AC3E}">
+        <p14:creationId xmlns:p14="http://schemas.microsoft.com/office/powerpoint/2010/main" val="1505622464"/>
+      </p:ext>
+    </p:extLst>
+  </p:cSld>
+  <p:clrMapOvr>
+    <a:masterClrMapping/>
+  </p:clrMapOvr>
+</p:sld>
+</file>
+
+<file path=ppt/slides/slide12.xml><?xml version="1.0" encoding="utf-8"?>
+<p:sld xmlns:a="http://schemas.openxmlformats.org/drawingml/2006/main" xmlns:r="http://schemas.openxmlformats.org/officeDocument/2006/relationships" xmlns:p="http://schemas.openxmlformats.org/presentationml/2006/main">
+  <p:cSld>
+    <p:spTree>
+      <p:nvGrpSpPr>
+        <p:cNvPr id="1" name=""/>
+        <p:cNvGrpSpPr/>
+        <p:nvPr/>
+      </p:nvGrpSpPr>
+      <p:grpSpPr>
+        <a:xfrm>
+          <a:off x="0" y="0"/>
+          <a:ext cx="0" cy="0"/>
+          <a:chOff x="0" y="0"/>
+          <a:chExt cx="0" cy="0"/>
+        </a:xfrm>
+      </p:grpSpPr>
+      <p:sp>
+        <p:nvSpPr>
+          <p:cNvPr id="2" name="Title 1"/>
+          <p:cNvSpPr>
+            <a:spLocks noGrp="1"/>
+          </p:cNvSpPr>
+          <p:nvPr>
+            <p:ph type="title"/>
+          </p:nvPr>
+        </p:nvSpPr>
+        <p:spPr/>
+        <p:txBody>
+          <a:bodyPr/>
+          <a:lstStyle/>
+          <a:p>
+            <a:r>
+              <a:rPr lang="en-US" dirty="0"/>
+              <a:t>Sprint 5</a:t>
+            </a:r>
+          </a:p>
+        </p:txBody>
+      </p:sp>
+      <p:pic>
+        <p:nvPicPr>
+          <p:cNvPr id="6" name="Picture 5">
+            <a:extLst>
+              <a:ext uri="{FF2B5EF4-FFF2-40B4-BE49-F238E27FC236}">
+                <a16:creationId xmlns:a16="http://schemas.microsoft.com/office/drawing/2014/main" id="{8995EB0B-5450-493A-813B-D23677A94BF8}"/>
+              </a:ext>
+            </a:extLst>
+          </p:cNvPr>
+          <p:cNvPicPr>
+            <a:picLocks noChangeAspect="1"/>
+          </p:cNvPicPr>
+          <p:nvPr/>
+        </p:nvPicPr>
+        <p:blipFill>
+          <a:blip r:embed="rId2"/>
+          <a:stretch>
+            <a:fillRect/>
+          </a:stretch>
+        </p:blipFill>
+        <p:spPr>
+          <a:xfrm>
+            <a:off x="1402118" y="1357067"/>
+            <a:ext cx="9387765" cy="4327808"/>
+          </a:xfrm>
+          <a:prstGeom prst="rect">
+            <a:avLst/>
+          </a:prstGeom>
+        </p:spPr>
+      </p:pic>
+    </p:spTree>
+    <p:extLst>
+      <p:ext uri="{BB962C8B-B14F-4D97-AF65-F5344CB8AC3E}">
+        <p14:creationId xmlns:p14="http://schemas.microsoft.com/office/powerpoint/2010/main" val="1536701730"/>
+      </p:ext>
+    </p:extLst>
+  </p:cSld>
+  <p:clrMapOvr>
+    <a:masterClrMapping/>
+  </p:clrMapOvr>
+</p:sld>
+</file>
+
 <file path=ppt/slides/slide2.xml><?xml version="1.0" encoding="utf-8"?>
 <p:sld xmlns:a="http://schemas.openxmlformats.org/drawingml/2006/main" xmlns:r="http://schemas.openxmlformats.org/officeDocument/2006/relationships" xmlns:p="http://schemas.openxmlformats.org/presentationml/2006/main">
   <p:cSld>
@@ -6890,6 +7162,95 @@
       </p:grpSpPr>
       <p:sp>
         <p:nvSpPr>
+          <p:cNvPr id="2" name="Title 1">
+            <a:extLst>
+              <a:ext uri="{FF2B5EF4-FFF2-40B4-BE49-F238E27FC236}">
+                <a16:creationId xmlns:a16="http://schemas.microsoft.com/office/drawing/2014/main" id="{844821A6-CE94-467A-94CF-13755933E061}"/>
+              </a:ext>
+            </a:extLst>
+          </p:cNvPr>
+          <p:cNvSpPr>
+            <a:spLocks noGrp="1"/>
+          </p:cNvSpPr>
+          <p:nvPr>
+            <p:ph type="title"/>
+          </p:nvPr>
+        </p:nvSpPr>
+        <p:spPr/>
+        <p:txBody>
+          <a:bodyPr/>
+          <a:lstStyle/>
+          <a:p>
+            <a:r>
+              <a:rPr lang="en-US" dirty="0"/>
+              <a:t>Sprint 1</a:t>
+            </a:r>
+          </a:p>
+        </p:txBody>
+      </p:sp>
+      <p:sp>
+        <p:nvSpPr>
+          <p:cNvPr id="3" name="Text Placeholder 2">
+            <a:extLst>
+              <a:ext uri="{FF2B5EF4-FFF2-40B4-BE49-F238E27FC236}">
+                <a16:creationId xmlns:a16="http://schemas.microsoft.com/office/drawing/2014/main" id="{568FA910-A946-4B61-BA4E-4723FD8E80DB}"/>
+              </a:ext>
+            </a:extLst>
+          </p:cNvPr>
+          <p:cNvSpPr>
+            <a:spLocks noGrp="1"/>
+          </p:cNvSpPr>
+          <p:nvPr>
+            <p:ph type="body" idx="1"/>
+          </p:nvPr>
+        </p:nvSpPr>
+        <p:spPr/>
+        <p:txBody>
+          <a:bodyPr/>
+          <a:lstStyle/>
+          <a:p>
+            <a:r>
+              <a:rPr lang="en-US" dirty="0"/>
+              <a:t>Accomplishments</a:t>
+            </a:r>
+          </a:p>
+          <a:p>
+            <a:endParaRPr lang="en-US" dirty="0"/>
+          </a:p>
+        </p:txBody>
+      </p:sp>
+    </p:spTree>
+    <p:extLst>
+      <p:ext uri="{BB962C8B-B14F-4D97-AF65-F5344CB8AC3E}">
+        <p14:creationId xmlns:p14="http://schemas.microsoft.com/office/powerpoint/2010/main" val="1627869533"/>
+      </p:ext>
+    </p:extLst>
+  </p:cSld>
+  <p:clrMapOvr>
+    <a:masterClrMapping/>
+  </p:clrMapOvr>
+</p:sld>
+</file>
+
+<file path=ppt/slides/slide5.xml><?xml version="1.0" encoding="utf-8"?>
+<p:sld xmlns:a="http://schemas.openxmlformats.org/drawingml/2006/main" xmlns:r="http://schemas.openxmlformats.org/officeDocument/2006/relationships" xmlns:p="http://schemas.openxmlformats.org/presentationml/2006/main">
+  <p:cSld>
+    <p:spTree>
+      <p:nvGrpSpPr>
+        <p:cNvPr id="1" name=""/>
+        <p:cNvGrpSpPr/>
+        <p:nvPr/>
+      </p:nvGrpSpPr>
+      <p:grpSpPr>
+        <a:xfrm>
+          <a:off x="0" y="0"/>
+          <a:ext cx="0" cy="0"/>
+          <a:chOff x="0" y="0"/>
+          <a:chExt cx="0" cy="0"/>
+        </a:xfrm>
+      </p:grpSpPr>
+      <p:sp>
+        <p:nvSpPr>
           <p:cNvPr id="2" name="Title 1"/>
           <p:cNvSpPr>
             <a:spLocks noGrp="1"/>
@@ -6953,132 +7314,6 @@
 </p:sld>
 </file>
 
-<file path=ppt/slides/slide5.xml><?xml version="1.0" encoding="utf-8"?>
-<p:sld xmlns:a="http://schemas.openxmlformats.org/drawingml/2006/main" xmlns:r="http://schemas.openxmlformats.org/officeDocument/2006/relationships" xmlns:p="http://schemas.openxmlformats.org/presentationml/2006/main">
-  <p:cSld>
-    <p:spTree>
-      <p:nvGrpSpPr>
-        <p:cNvPr id="1" name=""/>
-        <p:cNvGrpSpPr/>
-        <p:nvPr/>
-      </p:nvGrpSpPr>
-      <p:grpSpPr>
-        <a:xfrm>
-          <a:off x="0" y="0"/>
-          <a:ext cx="0" cy="0"/>
-          <a:chOff x="0" y="0"/>
-          <a:chExt cx="0" cy="0"/>
-        </a:xfrm>
-      </p:grpSpPr>
-      <p:sp>
-        <p:nvSpPr>
-          <p:cNvPr id="2" name="Title 1"/>
-          <p:cNvSpPr>
-            <a:spLocks noGrp="1"/>
-          </p:cNvSpPr>
-          <p:nvPr>
-            <p:ph type="title"/>
-          </p:nvPr>
-        </p:nvSpPr>
-        <p:spPr/>
-        <p:txBody>
-          <a:bodyPr/>
-          <a:lstStyle/>
-          <a:p>
-            <a:r>
-              <a:rPr lang="en-US" dirty="0"/>
-              <a:t>Sprint 5</a:t>
-            </a:r>
-          </a:p>
-        </p:txBody>
-      </p:sp>
-      <p:sp>
-        <p:nvSpPr>
-          <p:cNvPr id="3" name="Text Placeholder 2"/>
-          <p:cNvSpPr>
-            <a:spLocks noGrp="1"/>
-          </p:cNvSpPr>
-          <p:nvPr>
-            <p:ph type="body" idx="1"/>
-          </p:nvPr>
-        </p:nvSpPr>
-        <p:spPr/>
-        <p:txBody>
-          <a:bodyPr/>
-          <a:lstStyle/>
-          <a:p>
-            <a:r>
-              <a:rPr lang="en-US" dirty="0"/>
-              <a:t>Product Owner: Gabe Mayo</a:t>
-            </a:r>
-          </a:p>
-          <a:p>
-            <a:r>
-              <a:rPr lang="en-US" dirty="0"/>
-              <a:t>Scrum Master: Michael </a:t>
-            </a:r>
-            <a:r>
-              <a:rPr lang="en-US" dirty="0" err="1"/>
-              <a:t>Ouille</a:t>
-            </a:r>
-            <a:endParaRPr lang="en-US" dirty="0"/>
-          </a:p>
-          <a:p>
-            <a:r>
-              <a:rPr lang="en-US" dirty="0"/>
-              <a:t>Goals</a:t>
-            </a:r>
-          </a:p>
-          <a:p>
-            <a:pPr lvl="1"/>
-            <a:r>
-              <a:rPr lang="en-US" dirty="0"/>
-              <a:t>Dane: Movement functionality</a:t>
-            </a:r>
-          </a:p>
-          <a:p>
-            <a:pPr lvl="1"/>
-            <a:r>
-              <a:rPr lang="en-US" dirty="0"/>
-              <a:t>Michael: Creating and saving user profiles</a:t>
-            </a:r>
-          </a:p>
-          <a:p>
-            <a:pPr lvl="1"/>
-            <a:r>
-              <a:rPr lang="en-US" dirty="0"/>
-              <a:t>Gabe: Combat logic</a:t>
-            </a:r>
-          </a:p>
-          <a:p>
-            <a:pPr lvl="1"/>
-            <a:r>
-              <a:rPr lang="en-US" dirty="0"/>
-              <a:t>Billy: Modeling and intro video</a:t>
-            </a:r>
-          </a:p>
-          <a:p>
-            <a:pPr lvl="1"/>
-            <a:r>
-              <a:rPr lang="en-US" dirty="0"/>
-              <a:t>Chris: State controller</a:t>
-            </a:r>
-          </a:p>
-        </p:txBody>
-      </p:sp>
-    </p:spTree>
-    <p:extLst>
-      <p:ext uri="{BB962C8B-B14F-4D97-AF65-F5344CB8AC3E}">
-        <p14:creationId xmlns:p14="http://schemas.microsoft.com/office/powerpoint/2010/main" val="2013411079"/>
-      </p:ext>
-    </p:extLst>
-  </p:cSld>
-  <p:clrMapOvr>
-    <a:masterClrMapping/>
-  </p:clrMapOvr>
-</p:sld>
-</file>
-
 <file path=ppt/slides/slide6.xml><?xml version="1.0" encoding="utf-8"?>
 <p:sld xmlns:a="http://schemas.openxmlformats.org/drawingml/2006/main" xmlns:r="http://schemas.openxmlformats.org/officeDocument/2006/relationships" xmlns:p="http://schemas.openxmlformats.org/presentationml/2006/main">
   <p:cSld>
@@ -7118,12 +7353,258 @@
           </a:p>
         </p:txBody>
       </p:sp>
+      <p:sp>
+        <p:nvSpPr>
+          <p:cNvPr id="3" name="Text Placeholder 2"/>
+          <p:cNvSpPr>
+            <a:spLocks noGrp="1"/>
+          </p:cNvSpPr>
+          <p:nvPr>
+            <p:ph type="body" idx="1"/>
+          </p:nvPr>
+        </p:nvSpPr>
+        <p:spPr/>
+        <p:txBody>
+          <a:bodyPr/>
+          <a:lstStyle/>
+          <a:p>
+            <a:r>
+              <a:rPr lang="en-US" dirty="0"/>
+              <a:t>Product Owner: Gabe Mayo</a:t>
+            </a:r>
+          </a:p>
+          <a:p>
+            <a:r>
+              <a:rPr lang="en-US" dirty="0"/>
+              <a:t>Scrum Master: Michael </a:t>
+            </a:r>
+            <a:r>
+              <a:rPr lang="en-US" dirty="0" err="1"/>
+              <a:t>Ouille</a:t>
+            </a:r>
+            <a:endParaRPr lang="en-US" dirty="0"/>
+          </a:p>
+          <a:p>
+            <a:r>
+              <a:rPr lang="en-US" dirty="0"/>
+              <a:t>Goals</a:t>
+            </a:r>
+          </a:p>
+          <a:p>
+            <a:pPr lvl="1"/>
+            <a:r>
+              <a:rPr lang="en-US" dirty="0"/>
+              <a:t>Dane: Movement functionality</a:t>
+            </a:r>
+          </a:p>
+          <a:p>
+            <a:pPr lvl="1"/>
+            <a:r>
+              <a:rPr lang="en-US" dirty="0"/>
+              <a:t>Michael: Creating and saving user profiles</a:t>
+            </a:r>
+          </a:p>
+          <a:p>
+            <a:pPr lvl="1"/>
+            <a:r>
+              <a:rPr lang="en-US" dirty="0"/>
+              <a:t>Gabe: Combat logic</a:t>
+            </a:r>
+          </a:p>
+          <a:p>
+            <a:pPr lvl="1"/>
+            <a:r>
+              <a:rPr lang="en-US" dirty="0"/>
+              <a:t>Billy: Modeling and intro video</a:t>
+            </a:r>
+          </a:p>
+          <a:p>
+            <a:pPr lvl="1"/>
+            <a:r>
+              <a:rPr lang="en-US" dirty="0"/>
+              <a:t>Chris: State controller</a:t>
+            </a:r>
+          </a:p>
+        </p:txBody>
+      </p:sp>
+    </p:spTree>
+    <p:extLst>
+      <p:ext uri="{BB962C8B-B14F-4D97-AF65-F5344CB8AC3E}">
+        <p14:creationId xmlns:p14="http://schemas.microsoft.com/office/powerpoint/2010/main" val="2013411079"/>
+      </p:ext>
+    </p:extLst>
+  </p:cSld>
+  <p:clrMapOvr>
+    <a:masterClrMapping/>
+  </p:clrMapOvr>
+</p:sld>
+</file>
+
+<file path=ppt/slides/slide7.xml><?xml version="1.0" encoding="utf-8"?>
+<p:sld xmlns:a="http://schemas.openxmlformats.org/drawingml/2006/main" xmlns:r="http://schemas.openxmlformats.org/officeDocument/2006/relationships" xmlns:p="http://schemas.openxmlformats.org/presentationml/2006/main">
+  <p:cSld>
+    <p:spTree>
+      <p:nvGrpSpPr>
+        <p:cNvPr id="1" name=""/>
+        <p:cNvGrpSpPr/>
+        <p:nvPr/>
+      </p:nvGrpSpPr>
+      <p:grpSpPr>
+        <a:xfrm>
+          <a:off x="0" y="0"/>
+          <a:ext cx="0" cy="0"/>
+          <a:chOff x="0" y="0"/>
+          <a:chExt cx="0" cy="0"/>
+        </a:xfrm>
+      </p:grpSpPr>
+      <p:sp>
+        <p:nvSpPr>
+          <p:cNvPr id="2" name="Title 1">
+            <a:extLst>
+              <a:ext uri="{FF2B5EF4-FFF2-40B4-BE49-F238E27FC236}">
+                <a16:creationId xmlns:a16="http://schemas.microsoft.com/office/drawing/2014/main" id="{E6A88E44-BA06-4FE8-95CD-22C850789D2F}"/>
+              </a:ext>
+            </a:extLst>
+          </p:cNvPr>
+          <p:cNvSpPr>
+            <a:spLocks noGrp="1"/>
+          </p:cNvSpPr>
+          <p:nvPr>
+            <p:ph type="title"/>
+          </p:nvPr>
+        </p:nvSpPr>
+        <p:spPr/>
+        <p:txBody>
+          <a:bodyPr/>
+          <a:lstStyle/>
+          <a:p>
+            <a:r>
+              <a:rPr lang="en-US" dirty="0"/>
+              <a:t>Sprint 5</a:t>
+            </a:r>
+          </a:p>
+        </p:txBody>
+      </p:sp>
+      <p:sp>
+        <p:nvSpPr>
+          <p:cNvPr id="3" name="Text Placeholder 2">
+            <a:extLst>
+              <a:ext uri="{FF2B5EF4-FFF2-40B4-BE49-F238E27FC236}">
+                <a16:creationId xmlns:a16="http://schemas.microsoft.com/office/drawing/2014/main" id="{632C599F-0C37-41D9-87B9-D488BEE047B8}"/>
+              </a:ext>
+            </a:extLst>
+          </p:cNvPr>
+          <p:cNvSpPr>
+            <a:spLocks noGrp="1"/>
+          </p:cNvSpPr>
+          <p:nvPr>
+            <p:ph type="body" idx="1"/>
+          </p:nvPr>
+        </p:nvSpPr>
+        <p:spPr/>
+        <p:txBody>
+          <a:bodyPr/>
+          <a:lstStyle/>
+          <a:p>
+            <a:r>
+              <a:rPr lang="en-US" dirty="0"/>
+              <a:t>Dane’s Accomplishments</a:t>
+            </a:r>
+          </a:p>
+          <a:p>
+            <a:pPr lvl="1"/>
+            <a:r>
+              <a:rPr lang="en-US" dirty="0"/>
+              <a:t>Integrated Billy’s board code and his own.</a:t>
+            </a:r>
+          </a:p>
+          <a:p>
+            <a:pPr lvl="1"/>
+            <a:r>
+              <a:rPr lang="en-US" dirty="0"/>
+              <a:t>Implemented Billy’s models and floating animation.</a:t>
+            </a:r>
+          </a:p>
+          <a:p>
+            <a:pPr lvl="1"/>
+            <a:r>
+              <a:rPr lang="en-US" dirty="0"/>
+              <a:t>Spawned pieces on the board using Billy’s models.</a:t>
+            </a:r>
+          </a:p>
+          <a:p>
+            <a:pPr lvl="1"/>
+            <a:r>
+              <a:rPr lang="en-US" dirty="0"/>
+              <a:t>Enabled movement functionality.</a:t>
+            </a:r>
+          </a:p>
+        </p:txBody>
+      </p:sp>
+    </p:spTree>
+    <p:extLst>
+      <p:ext uri="{BB962C8B-B14F-4D97-AF65-F5344CB8AC3E}">
+        <p14:creationId xmlns:p14="http://schemas.microsoft.com/office/powerpoint/2010/main" val="1417358967"/>
+      </p:ext>
+    </p:extLst>
+  </p:cSld>
+  <p:clrMapOvr>
+    <a:masterClrMapping/>
+  </p:clrMapOvr>
+</p:sld>
+</file>
+
+<file path=ppt/slides/slide8.xml><?xml version="1.0" encoding="utf-8"?>
+<p:sld xmlns:a="http://schemas.openxmlformats.org/drawingml/2006/main" xmlns:r="http://schemas.openxmlformats.org/officeDocument/2006/relationships" xmlns:p="http://schemas.openxmlformats.org/presentationml/2006/main">
+  <p:cSld>
+    <p:spTree>
+      <p:nvGrpSpPr>
+        <p:cNvPr id="1" name=""/>
+        <p:cNvGrpSpPr/>
+        <p:nvPr/>
+      </p:nvGrpSpPr>
+      <p:grpSpPr>
+        <a:xfrm>
+          <a:off x="0" y="0"/>
+          <a:ext cx="0" cy="0"/>
+          <a:chOff x="0" y="0"/>
+          <a:chExt cx="0" cy="0"/>
+        </a:xfrm>
+      </p:grpSpPr>
+      <p:sp>
+        <p:nvSpPr>
+          <p:cNvPr id="2" name="Title 1">
+            <a:extLst>
+              <a:ext uri="{FF2B5EF4-FFF2-40B4-BE49-F238E27FC236}">
+                <a16:creationId xmlns:a16="http://schemas.microsoft.com/office/drawing/2014/main" id="{FBA96836-F26B-47FC-9DAD-55A8B57921C6}"/>
+              </a:ext>
+            </a:extLst>
+          </p:cNvPr>
+          <p:cNvSpPr>
+            <a:spLocks noGrp="1"/>
+          </p:cNvSpPr>
+          <p:nvPr>
+            <p:ph type="title"/>
+          </p:nvPr>
+        </p:nvSpPr>
+        <p:spPr/>
+        <p:txBody>
+          <a:bodyPr/>
+          <a:lstStyle/>
+          <a:p>
+            <a:r>
+              <a:rPr lang="en-US" dirty="0"/>
+              <a:t>Sprint 5</a:t>
+            </a:r>
+          </a:p>
+        </p:txBody>
+      </p:sp>
       <p:pic>
         <p:nvPicPr>
-          <p:cNvPr id="6" name="Picture 5">
+          <p:cNvPr id="4" name="Picture 3">
             <a:extLst>
               <a:ext uri="{FF2B5EF4-FFF2-40B4-BE49-F238E27FC236}">
-                <a16:creationId xmlns:a16="http://schemas.microsoft.com/office/drawing/2014/main" id="{8995EB0B-5450-493A-813B-D23677A94BF8}"/>
+                <a16:creationId xmlns:a16="http://schemas.microsoft.com/office/drawing/2014/main" id="{7CC695D4-CDC2-46C0-AA04-C1D20375A001}"/>
               </a:ext>
             </a:extLst>
           </p:cNvPr>
@@ -7140,8 +7621,8 @@
         </p:blipFill>
         <p:spPr>
           <a:xfrm>
-            <a:off x="1402118" y="1357067"/>
-            <a:ext cx="9387765" cy="4327808"/>
+            <a:off x="2125141" y="1094021"/>
+            <a:ext cx="7941717" cy="5120531"/>
           </a:xfrm>
           <a:prstGeom prst="rect">
             <a:avLst/>
@@ -7151,7 +7632,107 @@
     </p:spTree>
     <p:extLst>
       <p:ext uri="{BB962C8B-B14F-4D97-AF65-F5344CB8AC3E}">
-        <p14:creationId xmlns:p14="http://schemas.microsoft.com/office/powerpoint/2010/main" val="1536701730"/>
+        <p14:creationId xmlns:p14="http://schemas.microsoft.com/office/powerpoint/2010/main" val="1552308967"/>
+      </p:ext>
+    </p:extLst>
+  </p:cSld>
+  <p:clrMapOvr>
+    <a:masterClrMapping/>
+  </p:clrMapOvr>
+</p:sld>
+</file>
+
+<file path=ppt/slides/slide9.xml><?xml version="1.0" encoding="utf-8"?>
+<p:sld xmlns:a="http://schemas.openxmlformats.org/drawingml/2006/main" xmlns:r="http://schemas.openxmlformats.org/officeDocument/2006/relationships" xmlns:p="http://schemas.openxmlformats.org/presentationml/2006/main">
+  <p:cSld>
+    <p:spTree>
+      <p:nvGrpSpPr>
+        <p:cNvPr id="1" name=""/>
+        <p:cNvGrpSpPr/>
+        <p:nvPr/>
+      </p:nvGrpSpPr>
+      <p:grpSpPr>
+        <a:xfrm>
+          <a:off x="0" y="0"/>
+          <a:ext cx="0" cy="0"/>
+          <a:chOff x="0" y="0"/>
+          <a:chExt cx="0" cy="0"/>
+        </a:xfrm>
+      </p:grpSpPr>
+      <p:sp>
+        <p:nvSpPr>
+          <p:cNvPr id="2" name="Title 1">
+            <a:extLst>
+              <a:ext uri="{FF2B5EF4-FFF2-40B4-BE49-F238E27FC236}">
+                <a16:creationId xmlns:a16="http://schemas.microsoft.com/office/drawing/2014/main" id="{E6A88E44-BA06-4FE8-95CD-22C850789D2F}"/>
+              </a:ext>
+            </a:extLst>
+          </p:cNvPr>
+          <p:cNvSpPr>
+            <a:spLocks noGrp="1"/>
+          </p:cNvSpPr>
+          <p:nvPr>
+            <p:ph type="title"/>
+          </p:nvPr>
+        </p:nvSpPr>
+        <p:spPr/>
+        <p:txBody>
+          <a:bodyPr/>
+          <a:lstStyle/>
+          <a:p>
+            <a:r>
+              <a:rPr lang="en-US" dirty="0"/>
+              <a:t>Sprint 5</a:t>
+            </a:r>
+          </a:p>
+        </p:txBody>
+      </p:sp>
+      <p:sp>
+        <p:nvSpPr>
+          <p:cNvPr id="3" name="Text Placeholder 2">
+            <a:extLst>
+              <a:ext uri="{FF2B5EF4-FFF2-40B4-BE49-F238E27FC236}">
+                <a16:creationId xmlns:a16="http://schemas.microsoft.com/office/drawing/2014/main" id="{632C599F-0C37-41D9-87B9-D488BEE047B8}"/>
+              </a:ext>
+            </a:extLst>
+          </p:cNvPr>
+          <p:cNvSpPr>
+            <a:spLocks noGrp="1"/>
+          </p:cNvSpPr>
+          <p:nvPr>
+            <p:ph type="body" idx="1"/>
+          </p:nvPr>
+        </p:nvSpPr>
+        <p:spPr/>
+        <p:txBody>
+          <a:bodyPr/>
+          <a:lstStyle/>
+          <a:p>
+            <a:r>
+              <a:rPr lang="en-US" dirty="0"/>
+              <a:t>Michael’s Accomplishments</a:t>
+            </a:r>
+          </a:p>
+          <a:p>
+            <a:pPr lvl="1"/>
+            <a:r>
+              <a:rPr lang="en-US" dirty="0"/>
+              <a:t>Completed GUI for profile completion form and profile view form.</a:t>
+            </a:r>
+          </a:p>
+          <a:p>
+            <a:pPr lvl="1"/>
+            <a:r>
+              <a:rPr lang="en-US" dirty="0"/>
+              <a:t>Wrote scripts to save profile data to files.</a:t>
+            </a:r>
+          </a:p>
+        </p:txBody>
+      </p:sp>
+    </p:spTree>
+    <p:extLst>
+      <p:ext uri="{BB962C8B-B14F-4D97-AF65-F5344CB8AC3E}">
+        <p14:creationId xmlns:p14="http://schemas.microsoft.com/office/powerpoint/2010/main" val="2904051560"/>
       </p:ext>
     </p:extLst>
   </p:cSld>

</xml_diff>